<commit_message>
Adding Abstract, truthfulness and tweaks.
</commit_message>
<xml_diff>
--- a/EC Poster landscape.pptx
+++ b/EC Poster landscape.pptx
@@ -197,7 +197,7 @@
           <a:p>
             <a:fld id="{17E480F3-3EE5-9048-8CE1-6D7B76C3A5A1}" type="datetimeFigureOut">
               <a:rPr lang="en-FR" smtClean="0"/>
-              <a:t>10/06/2022</a:t>
+              <a:t>13/06/2022</a:t>
             </a:fld>
             <a:endParaRPr lang="en-FR"/>
           </a:p>
@@ -680,7 +680,7 @@
           <a:p>
             <a:fld id="{F3A114C4-1913-F640-BCBB-6052C52800F7}" type="datetimeFigureOut">
               <a:rPr lang="en-FR" smtClean="0"/>
-              <a:t>10/06/2022</a:t>
+              <a:t>13/06/2022</a:t>
             </a:fld>
             <a:endParaRPr lang="en-FR"/>
           </a:p>
@@ -850,7 +850,7 @@
           <a:p>
             <a:fld id="{F3A114C4-1913-F640-BCBB-6052C52800F7}" type="datetimeFigureOut">
               <a:rPr lang="en-FR" smtClean="0"/>
-              <a:t>10/06/2022</a:t>
+              <a:t>13/06/2022</a:t>
             </a:fld>
             <a:endParaRPr lang="en-FR"/>
           </a:p>
@@ -1030,7 +1030,7 @@
           <a:p>
             <a:fld id="{F3A114C4-1913-F640-BCBB-6052C52800F7}" type="datetimeFigureOut">
               <a:rPr lang="en-FR" smtClean="0"/>
-              <a:t>10/06/2022</a:t>
+              <a:t>13/06/2022</a:t>
             </a:fld>
             <a:endParaRPr lang="en-FR"/>
           </a:p>
@@ -1200,7 +1200,7 @@
           <a:p>
             <a:fld id="{F3A114C4-1913-F640-BCBB-6052C52800F7}" type="datetimeFigureOut">
               <a:rPr lang="en-FR" smtClean="0"/>
-              <a:t>10/06/2022</a:t>
+              <a:t>13/06/2022</a:t>
             </a:fld>
             <a:endParaRPr lang="en-FR"/>
           </a:p>
@@ -1444,7 +1444,7 @@
           <a:p>
             <a:fld id="{F3A114C4-1913-F640-BCBB-6052C52800F7}" type="datetimeFigureOut">
               <a:rPr lang="en-FR" smtClean="0"/>
-              <a:t>10/06/2022</a:t>
+              <a:t>13/06/2022</a:t>
             </a:fld>
             <a:endParaRPr lang="en-FR"/>
           </a:p>
@@ -1676,7 +1676,7 @@
           <a:p>
             <a:fld id="{F3A114C4-1913-F640-BCBB-6052C52800F7}" type="datetimeFigureOut">
               <a:rPr lang="en-FR" smtClean="0"/>
-              <a:t>10/06/2022</a:t>
+              <a:t>13/06/2022</a:t>
             </a:fld>
             <a:endParaRPr lang="en-FR"/>
           </a:p>
@@ -2043,7 +2043,7 @@
           <a:p>
             <a:fld id="{F3A114C4-1913-F640-BCBB-6052C52800F7}" type="datetimeFigureOut">
               <a:rPr lang="en-FR" smtClean="0"/>
-              <a:t>10/06/2022</a:t>
+              <a:t>13/06/2022</a:t>
             </a:fld>
             <a:endParaRPr lang="en-FR"/>
           </a:p>
@@ -2161,7 +2161,7 @@
           <a:p>
             <a:fld id="{F3A114C4-1913-F640-BCBB-6052C52800F7}" type="datetimeFigureOut">
               <a:rPr lang="en-FR" smtClean="0"/>
-              <a:t>10/06/2022</a:t>
+              <a:t>13/06/2022</a:t>
             </a:fld>
             <a:endParaRPr lang="en-FR"/>
           </a:p>
@@ -2256,7 +2256,7 @@
           <a:p>
             <a:fld id="{F3A114C4-1913-F640-BCBB-6052C52800F7}" type="datetimeFigureOut">
               <a:rPr lang="en-FR" smtClean="0"/>
-              <a:t>10/06/2022</a:t>
+              <a:t>13/06/2022</a:t>
             </a:fld>
             <a:endParaRPr lang="en-FR"/>
           </a:p>
@@ -2533,7 +2533,7 @@
           <a:p>
             <a:fld id="{F3A114C4-1913-F640-BCBB-6052C52800F7}" type="datetimeFigureOut">
               <a:rPr lang="en-FR" smtClean="0"/>
-              <a:t>10/06/2022</a:t>
+              <a:t>13/06/2022</a:t>
             </a:fld>
             <a:endParaRPr lang="en-FR"/>
           </a:p>
@@ -2790,7 +2790,7 @@
           <a:p>
             <a:fld id="{F3A114C4-1913-F640-BCBB-6052C52800F7}" type="datetimeFigureOut">
               <a:rPr lang="en-FR" smtClean="0"/>
-              <a:t>10/06/2022</a:t>
+              <a:t>13/06/2022</a:t>
             </a:fld>
             <a:endParaRPr lang="en-FR"/>
           </a:p>
@@ -3003,7 +3003,7 @@
           <a:p>
             <a:fld id="{F3A114C4-1913-F640-BCBB-6052C52800F7}" type="datetimeFigureOut">
               <a:rPr lang="en-FR" smtClean="0"/>
-              <a:t>10/06/2022</a:t>
+              <a:t>13/06/2022</a:t>
             </a:fld>
             <a:endParaRPr lang="en-FR"/>
           </a:p>
@@ -3669,7 +3669,7 @@
         <p:spPr bwMode="auto">
           <a:xfrm>
             <a:off x="382063" y="6220535"/>
-            <a:ext cx="13740337" cy="8428233"/>
+            <a:ext cx="13740337" cy="6948645"/>
           </a:xfrm>
           <a:prstGeom prst="roundRect">
             <a:avLst>
@@ -3714,7 +3714,7 @@
         <p:spPr bwMode="auto">
           <a:xfrm>
             <a:off x="725590" y="7603085"/>
-            <a:ext cx="12845408" cy="8084513"/>
+            <a:ext cx="12845408" cy="6237853"/>
           </a:xfrm>
           <a:prstGeom prst="rect">
             <a:avLst/>
@@ -3737,38 +3737,23 @@
             <a:pPr algn="just"/>
             <a:r>
               <a:rPr lang="en-GB" sz="4000" dirty="0"/>
-              <a:t>We live in an era where the complexity and size of mathematics and computer programs have well gone beyond what humans can understand and process. Checking and understanding </a:t>
+              <a:t>We introduce </a:t>
+            </a:r>
+            <a:r>
+              <a:rPr lang="en-GB" sz="4000" b="1" dirty="0" err="1"/>
+              <a:t>mech.v</a:t>
+            </a:r>
+            <a:r>
+              <a:rPr lang="en-GB" sz="4000" dirty="0"/>
+              <a:t>, an 6000-line open-source library of formally defined core mechanisms and concepts of </a:t>
             </a:r>
             <a:r>
               <a:rPr lang="en-GB" sz="4000" b="1" dirty="0"/>
-              <a:t>complex mathematical papers</a:t>
+              <a:t>mechanism design</a:t>
             </a:r>
             <a:r>
               <a:rPr lang="en-GB" sz="4000" dirty="0"/>
-              <a:t> can take months, or even years, and the process remains brittle. </a:t>
-            </a:r>
-          </a:p>
-          <a:p>
-            <a:pPr algn="just"/>
-            <a:r>
-              <a:rPr lang="en-GB" sz="4000" dirty="0"/>
-              <a:t>Mistakes in </a:t>
-            </a:r>
-            <a:r>
-              <a:rPr lang="en-GB" sz="4000" b="1" dirty="0"/>
-              <a:t>mechanism design </a:t>
-            </a:r>
-            <a:r>
-              <a:rPr lang="en-GB" sz="4000" dirty="0"/>
-              <a:t>theorems and software can be extremely costly, and create mistrust among rational players, due to risk, complexity, or both. Fortunately, solutions based on </a:t>
-            </a:r>
-            <a:r>
-              <a:rPr lang="en-GB" sz="4000" b="1" dirty="0"/>
-              <a:t>formal verification</a:t>
-            </a:r>
-            <a:r>
-              <a:rPr lang="en-GB" sz="4000" dirty="0"/>
-              <a:t>, using state-of-the-art computer programs called “proof assistants” such as </a:t>
+              <a:t> [1, 2]. It builds upon the widely-used </a:t>
             </a:r>
             <a:r>
               <a:rPr lang="en-GB" sz="4000" b="1" dirty="0"/>
@@ -3776,7 +3761,23 @@
             </a:r>
             <a:r>
               <a:rPr lang="en-GB" sz="4000" dirty="0"/>
-              <a:t> or Lean, provide help on those issues.</a:t>
+              <a:t> </a:t>
+            </a:r>
+            <a:r>
+              <a:rPr lang="en-GB" sz="4000" b="1" dirty="0"/>
+              <a:t>proof assistant </a:t>
+            </a:r>
+            <a:r>
+              <a:rPr lang="en-GB" sz="4000" dirty="0"/>
+              <a:t>and the Mathematical Components (MC) library to provides a strong infrastructure from which sound, formally </a:t>
+            </a:r>
+            <a:r>
+              <a:rPr lang="en-GB" sz="4000" b="1" dirty="0"/>
+              <a:t>machine-verified</a:t>
+            </a:r>
+            <a:r>
+              <a:rPr lang="en-GB" sz="4000" dirty="0"/>
+              <a:t> existing and new mechanisms can be developed, helping increase the confidence the services they offer are well-founded. </a:t>
             </a:r>
           </a:p>
           <a:p>
@@ -3836,7 +3837,7 @@
             </a:pPr>
             <a:r>
               <a:rPr lang="en-US" sz="6600" b="1" dirty="0"/>
-              <a:t>Motivation</a:t>
+              <a:t>Abstract</a:t>
             </a:r>
           </a:p>
         </p:txBody>
@@ -3857,7 +3858,7 @@
         </p:nvSpPr>
         <p:spPr bwMode="auto">
           <a:xfrm>
-            <a:off x="366268" y="14782609"/>
+            <a:off x="393873" y="13527810"/>
             <a:ext cx="13756132" cy="9732064"/>
           </a:xfrm>
           <a:prstGeom prst="roundRect">
@@ -3902,7 +3903,7 @@
         </p:nvSpPr>
         <p:spPr bwMode="auto">
           <a:xfrm>
-            <a:off x="784468" y="14873207"/>
+            <a:off x="812073" y="13618408"/>
             <a:ext cx="14293120" cy="1097985"/>
           </a:xfrm>
           <a:prstGeom prst="rect">
@@ -3951,7 +3952,7 @@
         </p:nvSpPr>
         <p:spPr bwMode="auto">
           <a:xfrm>
-            <a:off x="768286" y="15958008"/>
+            <a:off x="795891" y="14703209"/>
             <a:ext cx="12845408" cy="9192508"/>
           </a:xfrm>
           <a:prstGeom prst="rect">
@@ -4116,7 +4117,7 @@
             </a:r>
             <a:r>
               <a:rPr lang="en-GB" sz="4000" dirty="0"/>
-              <a:t>based on typing rules and tactic languages. A large number of existing libraries such as Mathematical Components (MC) enable a </a:t>
+              <a:t>based on typing rules and tactic languages. A large number of existing libraries such as Mathematical Components enable a </a:t>
             </a:r>
             <a:r>
               <a:rPr lang="en-GB" sz="4000" b="1" dirty="0"/>
@@ -4158,7 +4159,7 @@
         <p:spPr bwMode="auto">
           <a:xfrm>
             <a:off x="14309999" y="6220535"/>
-            <a:ext cx="13020401" cy="18315865"/>
+            <a:ext cx="13020401" cy="17039339"/>
           </a:xfrm>
           <a:prstGeom prst="roundRect">
             <a:avLst>
@@ -4203,7 +4204,7 @@
         <p:spPr bwMode="auto">
           <a:xfrm>
             <a:off x="14436203" y="7620765"/>
-            <a:ext cx="12538598" cy="17933363"/>
+            <a:ext cx="12538598" cy="15471150"/>
           </a:xfrm>
           <a:prstGeom prst="rect">
             <a:avLst/>
@@ -4233,23 +4234,7 @@
             </a:r>
             <a:r>
               <a:rPr lang="en-GB" sz="4000" dirty="0"/>
-              <a:t>We introduce </a:t>
-            </a:r>
-            <a:r>
-              <a:rPr lang="en-GB" sz="4000" b="1" dirty="0" err="1"/>
-              <a:t>mech.v</a:t>
-            </a:r>
-            <a:r>
-              <a:rPr lang="en-GB" sz="4000" dirty="0"/>
-              <a:t>, an open-source library of formally defined core mechanisms and concepts of mechanism design [2]; it builds upon the widely-used Coq proof assistant, the MC library and the </a:t>
-            </a:r>
-            <a:r>
-              <a:rPr lang="en-GB" sz="4000" dirty="0" err="1"/>
-              <a:t>SSReflect</a:t>
-            </a:r>
-            <a:r>
-              <a:rPr lang="en-GB" sz="4000" dirty="0"/>
-              <a:t> tactic language. The </a:t>
+              <a:t>The </a:t>
             </a:r>
             <a:r>
               <a:rPr lang="en-GB" sz="4000" dirty="0" err="1"/>
@@ -4257,7 +4242,7 @@
             </a:r>
             <a:r>
               <a:rPr lang="en-GB" sz="4000" dirty="0"/>
-              <a:t> library includes the specifications and correctness theorems (e.g., truthfulness, rationality or dominance) of well-known mechanisms and auctions such as the </a:t>
+              <a:t> library includes the specifications and correctness theorems (e.g., truthfulness, rationality, or dominance) of well-known mechanisms and auctions such as the </a:t>
             </a:r>
             <a:r>
               <a:rPr lang="en-GB" sz="4000" dirty="0" err="1"/>
@@ -4265,7 +4250,7 @@
             </a:r>
             <a:r>
               <a:rPr lang="en-GB" sz="4000" dirty="0"/>
-              <a:t>-Clarke-Groves (VCG) mechanism or the VCG for online ad or First Price and Second Price auctions.</a:t>
+              <a:t>-Clarke-Groves (VCG) mechanism, the VCG auction for online ad or First Price and Second Price auctions.</a:t>
             </a:r>
           </a:p>
           <a:p>
@@ -4395,8 +4380,8 @@
         </p:nvSpPr>
         <p:spPr bwMode="auto">
           <a:xfrm>
-            <a:off x="27563519" y="487365"/>
-            <a:ext cx="14873976" cy="19066208"/>
+            <a:off x="27535914" y="471337"/>
+            <a:ext cx="14873976" cy="24149805"/>
           </a:xfrm>
           <a:prstGeom prst="roundRect">
             <a:avLst>
@@ -4440,7 +4425,7 @@
         </p:nvSpPr>
         <p:spPr bwMode="auto">
           <a:xfrm>
-            <a:off x="28040446" y="864791"/>
+            <a:off x="28012841" y="493423"/>
             <a:ext cx="14293120" cy="1097985"/>
           </a:xfrm>
           <a:prstGeom prst="rect">
@@ -4494,8 +4479,8 @@
         </p:nvSpPr>
         <p:spPr bwMode="auto">
           <a:xfrm>
-            <a:off x="28040446" y="2136667"/>
-            <a:ext cx="14170008" cy="17933363"/>
+            <a:off x="28012841" y="1765299"/>
+            <a:ext cx="14170008" cy="29136430"/>
           </a:xfrm>
           <a:prstGeom prst="rect">
             <a:avLst/>
@@ -4518,15 +4503,13 @@
             <a:pPr algn="just"/>
             <a:r>
               <a:rPr lang="en-GB" sz="4000" dirty="0">
-                <a:latin typeface="Arial" panose="020B0604020202020204" pitchFamily="34" charset="0"/>
                 <a:ea typeface="Verdana" panose="020B0604030504040204" pitchFamily="34" charset="0"/>
                 <a:cs typeface="Arial" panose="020B0604020202020204" pitchFamily="34" charset="0"/>
               </a:rPr>
-              <a:t>Below is a direct Coq specification of the VCG mechanism involving </a:t>
+              <a:t>A direct Coq specification of the General VCG mechanism involving </a:t>
             </a:r>
             <a:r>
               <a:rPr lang="en-GB" sz="4000" i="1" dirty="0">
-                <a:latin typeface="Arial" panose="020B0604020202020204" pitchFamily="34" charset="0"/>
                 <a:ea typeface="Verdana" panose="020B0604030504040204" pitchFamily="34" charset="0"/>
                 <a:cs typeface="Arial" panose="020B0604020202020204" pitchFamily="34" charset="0"/>
               </a:rPr>
@@ -4534,7 +4517,6 @@
             </a:r>
             <a:r>
               <a:rPr lang="en-GB" sz="4000" dirty="0">
-                <a:latin typeface="Arial" panose="020B0604020202020204" pitchFamily="34" charset="0"/>
                 <a:ea typeface="Verdana" panose="020B0604030504040204" pitchFamily="34" charset="0"/>
                 <a:cs typeface="Arial" panose="020B0604020202020204" pitchFamily="34" charset="0"/>
               </a:rPr>
@@ -4542,7 +4524,6 @@
             </a:r>
             <a:r>
               <a:rPr lang="en-GB" sz="4000" i="1" dirty="0">
-                <a:latin typeface="Arial" panose="020B0604020202020204" pitchFamily="34" charset="0"/>
                 <a:ea typeface="Verdana" panose="020B0604030504040204" pitchFamily="34" charset="0"/>
                 <a:cs typeface="Arial" panose="020B0604020202020204" pitchFamily="34" charset="0"/>
               </a:rPr>
@@ -4550,7 +4531,6 @@
             </a:r>
             <a:r>
               <a:rPr lang="en-GB" sz="4000" dirty="0">
-                <a:latin typeface="Arial" panose="020B0604020202020204" pitchFamily="34" charset="0"/>
                 <a:ea typeface="Verdana" panose="020B0604030504040204" pitchFamily="34" charset="0"/>
                 <a:cs typeface="Arial" panose="020B0604020202020204" pitchFamily="34" charset="0"/>
               </a:rPr>
@@ -4558,7 +4538,6 @@
             </a:r>
             <a:r>
               <a:rPr lang="en-GB" sz="4000" i="1" dirty="0">
-                <a:latin typeface="Arial" panose="020B0604020202020204" pitchFamily="34" charset="0"/>
                 <a:ea typeface="Verdana" panose="020B0604030504040204" pitchFamily="34" charset="0"/>
                 <a:cs typeface="Arial" panose="020B0604020202020204" pitchFamily="34" charset="0"/>
               </a:rPr>
@@ -4566,7 +4545,6 @@
             </a:r>
             <a:r>
               <a:rPr lang="en-GB" sz="4000" dirty="0">
-                <a:latin typeface="Arial" panose="020B0604020202020204" pitchFamily="34" charset="0"/>
                 <a:ea typeface="Verdana" panose="020B0604030504040204" pitchFamily="34" charset="0"/>
                 <a:cs typeface="Arial" panose="020B0604020202020204" pitchFamily="34" charset="0"/>
               </a:rPr>
@@ -4574,7 +4552,6 @@
             </a:r>
             <a:r>
               <a:rPr lang="en-GB" sz="4000" i="1" dirty="0">
-                <a:latin typeface="Arial" panose="020B0604020202020204" pitchFamily="34" charset="0"/>
                 <a:ea typeface="Verdana" panose="020B0604030504040204" pitchFamily="34" charset="0"/>
                 <a:cs typeface="Arial" panose="020B0604020202020204" pitchFamily="34" charset="0"/>
               </a:rPr>
@@ -4582,7 +4559,6 @@
             </a:r>
             <a:r>
               <a:rPr lang="en-GB" sz="4000" dirty="0">
-                <a:latin typeface="Arial" panose="020B0604020202020204" pitchFamily="34" charset="0"/>
                 <a:ea typeface="Verdana" panose="020B0604030504040204" pitchFamily="34" charset="0"/>
                 <a:cs typeface="Arial" panose="020B0604020202020204" pitchFamily="34" charset="0"/>
               </a:rPr>
@@ -4590,7 +4566,6 @@
             </a:r>
             <a:r>
               <a:rPr lang="en-GB" sz="4000" i="1" dirty="0" err="1">
-                <a:latin typeface="Arial" panose="020B0604020202020204" pitchFamily="34" charset="0"/>
                 <a:ea typeface="Verdana" panose="020B0604030504040204" pitchFamily="34" charset="0"/>
                 <a:cs typeface="Arial" panose="020B0604020202020204" pitchFamily="34" charset="0"/>
               </a:rPr>
@@ -4598,7 +4573,6 @@
             </a:r>
             <a:r>
               <a:rPr lang="en-GB" sz="4000" dirty="0">
-                <a:latin typeface="Arial" panose="020B0604020202020204" pitchFamily="34" charset="0"/>
                 <a:ea typeface="Verdana" panose="020B0604030504040204" pitchFamily="34" charset="0"/>
                 <a:cs typeface="Arial" panose="020B0604020202020204" pitchFamily="34" charset="0"/>
               </a:rPr>
@@ -4606,7 +4580,6 @@
             </a:r>
             <a:r>
               <a:rPr lang="en-GB" sz="4000" i="1" dirty="0">
-                <a:latin typeface="Arial" panose="020B0604020202020204" pitchFamily="34" charset="0"/>
                 <a:ea typeface="Verdana" panose="020B0604030504040204" pitchFamily="34" charset="0"/>
                 <a:cs typeface="Arial" panose="020B0604020202020204" pitchFamily="34" charset="0"/>
               </a:rPr>
@@ -4614,7 +4587,6 @@
             </a:r>
             <a:r>
               <a:rPr lang="en-GB" sz="4000" i="1" dirty="0" err="1">
-                <a:latin typeface="Arial" panose="020B0604020202020204" pitchFamily="34" charset="0"/>
                 <a:ea typeface="Verdana" panose="020B0604030504040204" pitchFamily="34" charset="0"/>
                 <a:cs typeface="Arial" panose="020B0604020202020204" pitchFamily="34" charset="0"/>
               </a:rPr>
@@ -4622,7 +4594,6 @@
             </a:r>
             <a:r>
               <a:rPr lang="en-GB" sz="4000" i="1" dirty="0">
-                <a:latin typeface="Arial" panose="020B0604020202020204" pitchFamily="34" charset="0"/>
                 <a:ea typeface="Verdana" panose="020B0604030504040204" pitchFamily="34" charset="0"/>
                 <a:cs typeface="Arial" panose="020B0604020202020204" pitchFamily="34" charset="0"/>
               </a:rPr>
@@ -4630,7 +4601,6 @@
             </a:r>
             <a:r>
               <a:rPr lang="en-GB" sz="4000" i="1" dirty="0" err="1">
-                <a:latin typeface="Arial" panose="020B0604020202020204" pitchFamily="34" charset="0"/>
                 <a:ea typeface="Verdana" panose="020B0604030504040204" pitchFamily="34" charset="0"/>
                 <a:cs typeface="Arial" panose="020B0604020202020204" pitchFamily="34" charset="0"/>
               </a:rPr>
@@ -4638,7 +4608,6 @@
             </a:r>
             <a:r>
               <a:rPr lang="en-GB" sz="4000" i="1" dirty="0">
-                <a:latin typeface="Arial" panose="020B0604020202020204" pitchFamily="34" charset="0"/>
                 <a:ea typeface="Verdana" panose="020B0604030504040204" pitchFamily="34" charset="0"/>
                 <a:cs typeface="Arial" panose="020B0604020202020204" pitchFamily="34" charset="0"/>
               </a:rPr>
@@ -4646,7 +4615,6 @@
             </a:r>
             <a:r>
               <a:rPr lang="en-GB" sz="4000" dirty="0">
-                <a:latin typeface="Arial" panose="020B0604020202020204" pitchFamily="34" charset="0"/>
                 <a:ea typeface="Verdana" panose="020B0604030504040204" pitchFamily="34" charset="0"/>
                 <a:cs typeface="Arial" panose="020B0604020202020204" pitchFamily="34" charset="0"/>
               </a:rPr>
@@ -4654,7 +4622,6 @@
             </a:r>
             <a:r>
               <a:rPr lang="en-GB" sz="4000" i="1" dirty="0">
-                <a:latin typeface="Arial" panose="020B0604020202020204" pitchFamily="34" charset="0"/>
                 <a:ea typeface="Verdana" panose="020B0604030504040204" pitchFamily="34" charset="0"/>
                 <a:cs typeface="Arial" panose="020B0604020202020204" pitchFamily="34" charset="0"/>
               </a:rPr>
@@ -4662,20 +4629,15 @@
             </a:r>
             <a:r>
               <a:rPr lang="en-GB" sz="4000" dirty="0">
-                <a:latin typeface="Arial" panose="020B0604020202020204" pitchFamily="34" charset="0"/>
                 <a:ea typeface="Verdana" panose="020B0604030504040204" pitchFamily="34" charset="0"/>
                 <a:cs typeface="Arial" panose="020B0604020202020204" pitchFamily="34" charset="0"/>
               </a:rPr>
-              <a:t> to natural numbers (the bidding action of one agent)</a:t>
-            </a:r>
-            <a:r>
-              <a:rPr lang="en-GB" sz="4000" i="1" dirty="0">
-                <a:latin typeface="Arial" panose="020B0604020202020204" pitchFamily="34" charset="0"/>
-                <a:ea typeface="Verdana" panose="020B0604030504040204" pitchFamily="34" charset="0"/>
-                <a:cs typeface="Arial" panose="020B0604020202020204" pitchFamily="34" charset="0"/>
-              </a:rPr>
-              <a:t>.</a:t>
-            </a:r>
+              <a:t> to natural numbers (the bidding action of one agent), can be written as follows.</a:t>
+            </a:r>
+            <a:endParaRPr lang="en-GB" sz="4000" i="1" dirty="0">
+              <a:ea typeface="Verdana" panose="020B0604030504040204" pitchFamily="34" charset="0"/>
+              <a:cs typeface="Arial" panose="020B0604020202020204" pitchFamily="34" charset="0"/>
+            </a:endParaRPr>
           </a:p>
           <a:p>
             <a:pPr algn="l"/>
@@ -4798,7 +4760,20 @@
                 <a:ea typeface="Verdana" panose="020B0604030504040204" pitchFamily="34" charset="0"/>
                 <a:cs typeface="Verdana" panose="020B0604030504040204" pitchFamily="34" charset="0"/>
               </a:rPr>
-              <a:t>}.</a:t>
+              <a:t>}.   </a:t>
+            </a:r>
+            <a:r>
+              <a:rPr lang="en-GB" sz="3200" dirty="0">
+                <a:solidFill>
+                  <a:schemeClr val="accent2">
+                    <a:lumMod val="75000"/>
+                  </a:schemeClr>
+                </a:solidFill>
+                <a:latin typeface="Verdana" panose="020B0604030504040204" pitchFamily="34" charset="0"/>
+                <a:ea typeface="Verdana" panose="020B0604030504040204" pitchFamily="34" charset="0"/>
+                <a:cs typeface="Verdana" panose="020B0604030504040204" pitchFamily="34" charset="0"/>
+              </a:rPr>
+              <a:t>(* from outcomes to bids *)</a:t>
             </a:r>
             <a:br>
               <a:rPr lang="en-GB" sz="3200" dirty="0">
@@ -4939,7 +4914,7 @@
                 <a:ea typeface="Verdana" panose="020B0604030504040204" pitchFamily="34" charset="0"/>
                 <a:cs typeface="Verdana" panose="020B0604030504040204" pitchFamily="34" charset="0"/>
               </a:rPr>
-              <a:t>(o : O) ( bs : biddings). </a:t>
+              <a:t>(o : O) (bs : biddings). </a:t>
             </a:r>
           </a:p>
           <a:p>
@@ -5372,14 +5347,6 @@
           </a:p>
           <a:p>
             <a:pPr algn="l"/>
-            <a:endParaRPr lang="en-GB" sz="3200" dirty="0">
-              <a:latin typeface="Verdana" panose="020B0604030504040204" pitchFamily="34" charset="0"/>
-              <a:ea typeface="Verdana" panose="020B0604030504040204" pitchFamily="34" charset="0"/>
-              <a:cs typeface="Verdana" panose="020B0604030504040204" pitchFamily="34" charset="0"/>
-            </a:endParaRPr>
-          </a:p>
-          <a:p>
-            <a:pPr algn="l"/>
             <a:r>
               <a:rPr lang="en-GB" sz="3200" dirty="0">
                 <a:solidFill>
@@ -5444,15 +5411,13 @@
             <a:pPr algn="just"/>
             <a:r>
               <a:rPr lang="en-GB" sz="4000" dirty="0">
-                <a:latin typeface="Arial" panose="020B0604020202020204" pitchFamily="34" charset="0"/>
                 <a:ea typeface="Verdana" panose="020B0604030504040204" pitchFamily="34" charset="0"/>
                 <a:cs typeface="Arial" panose="020B0604020202020204" pitchFamily="34" charset="0"/>
               </a:rPr>
-              <a:t>This specification, close to its mathematical definition, can be used to define VCG as an instance, </a:t>
+              <a:t>This specification, close to its mathematical definition, can be used to see VCG as an instance, </a:t>
             </a:r>
             <a:r>
               <a:rPr lang="en-GB" sz="4000" i="1" dirty="0">
-                <a:latin typeface="Arial" panose="020B0604020202020204" pitchFamily="34" charset="0"/>
                 <a:ea typeface="Verdana" panose="020B0604030504040204" pitchFamily="34" charset="0"/>
                 <a:cs typeface="Arial" panose="020B0604020202020204" pitchFamily="34" charset="0"/>
               </a:rPr>
@@ -5460,15 +5425,13 @@
             </a:r>
             <a:r>
               <a:rPr lang="en-GB" sz="4000" dirty="0">
-                <a:latin typeface="Arial" panose="020B0604020202020204" pitchFamily="34" charset="0"/>
                 <a:ea typeface="Verdana" panose="020B0604030504040204" pitchFamily="34" charset="0"/>
                 <a:cs typeface="Arial" panose="020B0604020202020204" pitchFamily="34" charset="0"/>
               </a:rPr>
-              <a:t>, of a mechanism, of type </a:t>
+              <a:t>, of a general mechanism, of type </a:t>
             </a:r>
             <a:r>
               <a:rPr lang="en-GB" sz="4000" i="1" dirty="0" err="1">
-                <a:latin typeface="Arial" panose="020B0604020202020204" pitchFamily="34" charset="0"/>
                 <a:ea typeface="Verdana" panose="020B0604030504040204" pitchFamily="34" charset="0"/>
                 <a:cs typeface="Arial" panose="020B0604020202020204" pitchFamily="34" charset="0"/>
               </a:rPr>
@@ -5476,7 +5439,6 @@
             </a:r>
             <a:r>
               <a:rPr lang="en-GB" sz="4000" dirty="0">
-                <a:latin typeface="Arial" panose="020B0604020202020204" pitchFamily="34" charset="0"/>
                 <a:ea typeface="Verdana" panose="020B0604030504040204" pitchFamily="34" charset="0"/>
                 <a:cs typeface="Arial" panose="020B0604020202020204" pitchFamily="34" charset="0"/>
               </a:rPr>
@@ -5484,7 +5446,6 @@
             </a:r>
             <a:r>
               <a:rPr lang="en-GB" sz="4000" dirty="0" err="1">
-                <a:latin typeface="Arial" panose="020B0604020202020204" pitchFamily="34" charset="0"/>
                 <a:ea typeface="Verdana" panose="020B0604030504040204" pitchFamily="34" charset="0"/>
                 <a:cs typeface="Arial" panose="020B0604020202020204" pitchFamily="34" charset="0"/>
               </a:rPr>
@@ -5492,7 +5453,6 @@
             </a:r>
             <a:r>
               <a:rPr lang="en-GB" sz="4000" dirty="0">
-                <a:latin typeface="Arial" panose="020B0604020202020204" pitchFamily="34" charset="0"/>
                 <a:ea typeface="Verdana" panose="020B0604030504040204" pitchFamily="34" charset="0"/>
                 <a:cs typeface="Arial" panose="020B0604020202020204" pitchFamily="34" charset="0"/>
               </a:rPr>
@@ -5721,6 +5681,260 @@
               </a:rPr>
               <a:t> o0 bs)). </a:t>
             </a:r>
+          </a:p>
+          <a:p>
+            <a:pPr algn="l"/>
+            <a:endParaRPr lang="en-GB" sz="3200" dirty="0">
+              <a:latin typeface="Verdana" panose="020B0604030504040204" pitchFamily="34" charset="0"/>
+              <a:ea typeface="Verdana" panose="020B0604030504040204" pitchFamily="34" charset="0"/>
+              <a:cs typeface="Verdana" panose="020B0604030504040204" pitchFamily="34" charset="0"/>
+            </a:endParaRPr>
+          </a:p>
+          <a:p>
+            <a:pPr algn="l"/>
+            <a:r>
+              <a:rPr lang="en-GB" sz="4000" dirty="0">
+                <a:ea typeface="Verdana" panose="020B0604030504040204" pitchFamily="34" charset="0"/>
+                <a:cs typeface="Verdana" panose="020B0604030504040204" pitchFamily="34" charset="0"/>
+              </a:rPr>
+              <a:t>VCG’s truthfulness theorem can then be specified and easily proven in Coq via the general definition, </a:t>
+            </a:r>
+            <a:r>
+              <a:rPr lang="en-GB" sz="4000" i="1" dirty="0">
+                <a:ea typeface="Verdana" panose="020B0604030504040204" pitchFamily="34" charset="0"/>
+                <a:cs typeface="Verdana" panose="020B0604030504040204" pitchFamily="34" charset="0"/>
+              </a:rPr>
+              <a:t>truthful</a:t>
+            </a:r>
+            <a:r>
+              <a:rPr lang="en-GB" sz="4000" dirty="0">
+                <a:ea typeface="Verdana" panose="020B0604030504040204" pitchFamily="34" charset="0"/>
+                <a:cs typeface="Verdana" panose="020B0604030504040204" pitchFamily="34" charset="0"/>
+              </a:rPr>
+              <a:t>, of truthfulness provided in </a:t>
+            </a:r>
+            <a:r>
+              <a:rPr lang="en-GB" sz="4000" dirty="0" err="1">
+                <a:ea typeface="Verdana" panose="020B0604030504040204" pitchFamily="34" charset="0"/>
+                <a:cs typeface="Verdana" panose="020B0604030504040204" pitchFamily="34" charset="0"/>
+              </a:rPr>
+              <a:t>mech.v</a:t>
+            </a:r>
+            <a:r>
+              <a:rPr lang="en-GB" sz="4000" dirty="0">
+                <a:ea typeface="Verdana" panose="020B0604030504040204" pitchFamily="34" charset="0"/>
+                <a:cs typeface="Verdana" panose="020B0604030504040204" pitchFamily="34" charset="0"/>
+              </a:rPr>
+              <a:t> (see [1]).</a:t>
+            </a:r>
+          </a:p>
+          <a:p>
+            <a:pPr algn="l"/>
+            <a:endParaRPr lang="en-GB" sz="4000" dirty="0">
+              <a:solidFill>
+                <a:srgbClr val="D93FBE"/>
+              </a:solidFill>
+              <a:ea typeface="Verdana" panose="020B0604030504040204" pitchFamily="34" charset="0"/>
+              <a:cs typeface="Verdana" panose="020B0604030504040204" pitchFamily="34" charset="0"/>
+            </a:endParaRPr>
+          </a:p>
+          <a:p>
+            <a:pPr algn="l"/>
+            <a:r>
+              <a:rPr lang="en-GB" sz="3200" dirty="0">
+                <a:solidFill>
+                  <a:srgbClr val="D93FBE"/>
+                </a:solidFill>
+                <a:latin typeface="Verdana" panose="020B0604030504040204" pitchFamily="34" charset="0"/>
+                <a:ea typeface="Verdana" panose="020B0604030504040204" pitchFamily="34" charset="0"/>
+                <a:cs typeface="Verdana" panose="020B0604030504040204" pitchFamily="34" charset="0"/>
+              </a:rPr>
+              <a:t>Lemma</a:t>
+            </a:r>
+            <a:r>
+              <a:rPr lang="en-GB" sz="3200" dirty="0">
+                <a:latin typeface="Verdana" panose="020B0604030504040204" pitchFamily="34" charset="0"/>
+                <a:ea typeface="Verdana" panose="020B0604030504040204" pitchFamily="34" charset="0"/>
+                <a:cs typeface="Verdana" panose="020B0604030504040204" pitchFamily="34" charset="0"/>
+              </a:rPr>
+              <a:t> </a:t>
+            </a:r>
+            <a:r>
+              <a:rPr lang="en-GB" sz="3200" dirty="0" err="1">
+                <a:latin typeface="Verdana" panose="020B0604030504040204" pitchFamily="34" charset="0"/>
+                <a:ea typeface="Verdana" panose="020B0604030504040204" pitchFamily="34" charset="0"/>
+                <a:cs typeface="Verdana" panose="020B0604030504040204" pitchFamily="34" charset="0"/>
+              </a:rPr>
+              <a:t>truthful_General_VCG</a:t>
+            </a:r>
+            <a:r>
+              <a:rPr lang="en-GB" sz="3200" dirty="0">
+                <a:latin typeface="Verdana" panose="020B0604030504040204" pitchFamily="34" charset="0"/>
+                <a:ea typeface="Verdana" panose="020B0604030504040204" pitchFamily="34" charset="0"/>
+                <a:cs typeface="Verdana" panose="020B0604030504040204" pitchFamily="34" charset="0"/>
+              </a:rPr>
+              <a:t> : truthful p.</a:t>
+            </a:r>
+          </a:p>
+          <a:p>
+            <a:pPr algn="l"/>
+            <a:endParaRPr lang="en-GB" sz="4000" dirty="0">
+              <a:ea typeface="Verdana" panose="020B0604030504040204" pitchFamily="34" charset="0"/>
+              <a:cs typeface="Verdana" panose="020B0604030504040204" pitchFamily="34" charset="0"/>
+            </a:endParaRPr>
+          </a:p>
+          <a:p>
+            <a:pPr algn="l"/>
+            <a:r>
+              <a:rPr lang="en-GB" sz="4000" dirty="0">
+                <a:ea typeface="Verdana" panose="020B0604030504040204" pitchFamily="34" charset="0"/>
+                <a:cs typeface="Verdana" panose="020B0604030504040204" pitchFamily="34" charset="0"/>
+              </a:rPr>
+              <a:t>where </a:t>
+            </a:r>
+            <a:r>
+              <a:rPr lang="en-GB" sz="4000" i="1" dirty="0">
+                <a:ea typeface="Verdana" panose="020B0604030504040204" pitchFamily="34" charset="0"/>
+                <a:cs typeface="Verdana" panose="020B0604030504040204" pitchFamily="34" charset="0"/>
+              </a:rPr>
+              <a:t>p</a:t>
+            </a:r>
+            <a:r>
+              <a:rPr lang="en-GB" sz="4000" dirty="0">
+                <a:ea typeface="Verdana" panose="020B0604030504040204" pitchFamily="34" charset="0"/>
+                <a:cs typeface="Verdana" panose="020B0604030504040204" pitchFamily="34" charset="0"/>
+              </a:rPr>
+              <a:t>, the preferences, or profile, of each agent, of type </a:t>
+            </a:r>
+            <a:r>
+              <a:rPr lang="en-GB" sz="4000" i="1" dirty="0" err="1">
+                <a:ea typeface="Verdana" panose="020B0604030504040204" pitchFamily="34" charset="0"/>
+                <a:cs typeface="Verdana" panose="020B0604030504040204" pitchFamily="34" charset="0"/>
+              </a:rPr>
+              <a:t>prefs.type</a:t>
+            </a:r>
+            <a:r>
+              <a:rPr lang="en-GB" sz="4000" dirty="0">
+                <a:ea typeface="Verdana" panose="020B0604030504040204" pitchFamily="34" charset="0"/>
+                <a:cs typeface="Verdana" panose="020B0604030504040204" pitchFamily="34" charset="0"/>
+              </a:rPr>
+              <a:t>, specifies the true value strategy, current strategy and utility function for </a:t>
+            </a:r>
+            <a:r>
+              <a:rPr lang="en-GB" sz="4000" i="1" dirty="0">
+                <a:ea typeface="Verdana" panose="020B0604030504040204" pitchFamily="34" charset="0"/>
+                <a:cs typeface="Verdana" panose="020B0604030504040204" pitchFamily="34" charset="0"/>
+              </a:rPr>
+              <a:t>m</a:t>
+            </a:r>
+            <a:r>
+              <a:rPr lang="en-GB" sz="4000" dirty="0">
+                <a:ea typeface="Verdana" panose="020B0604030504040204" pitchFamily="34" charset="0"/>
+                <a:cs typeface="Verdana" panose="020B0604030504040204" pitchFamily="34" charset="0"/>
+              </a:rPr>
+              <a:t> (see [1]).</a:t>
+            </a:r>
+            <a:endParaRPr lang="en-GB" sz="3200" dirty="0">
+              <a:latin typeface="Verdana" panose="020B0604030504040204" pitchFamily="34" charset="0"/>
+              <a:ea typeface="Verdana" panose="020B0604030504040204" pitchFamily="34" charset="0"/>
+              <a:cs typeface="Verdana" panose="020B0604030504040204" pitchFamily="34" charset="0"/>
+            </a:endParaRPr>
+          </a:p>
+          <a:p>
+            <a:pPr algn="l"/>
+            <a:endParaRPr lang="en-GB" sz="3200" dirty="0">
+              <a:latin typeface="Verdana" panose="020B0604030504040204" pitchFamily="34" charset="0"/>
+              <a:ea typeface="Verdana" panose="020B0604030504040204" pitchFamily="34" charset="0"/>
+              <a:cs typeface="Verdana" panose="020B0604030504040204" pitchFamily="34" charset="0"/>
+            </a:endParaRPr>
+          </a:p>
+          <a:p>
+            <a:pPr algn="l"/>
+            <a:endParaRPr lang="en-GB" sz="3200" dirty="0">
+              <a:latin typeface="Verdana" panose="020B0604030504040204" pitchFamily="34" charset="0"/>
+              <a:ea typeface="Verdana" panose="020B0604030504040204" pitchFamily="34" charset="0"/>
+              <a:cs typeface="Verdana" panose="020B0604030504040204" pitchFamily="34" charset="0"/>
+            </a:endParaRPr>
+          </a:p>
+          <a:p>
+            <a:pPr algn="l"/>
+            <a:endParaRPr lang="en-GB" sz="3200" dirty="0">
+              <a:latin typeface="Verdana" panose="020B0604030504040204" pitchFamily="34" charset="0"/>
+              <a:ea typeface="Verdana" panose="020B0604030504040204" pitchFamily="34" charset="0"/>
+              <a:cs typeface="Verdana" panose="020B0604030504040204" pitchFamily="34" charset="0"/>
+            </a:endParaRPr>
+          </a:p>
+          <a:p>
+            <a:pPr algn="l"/>
+            <a:endParaRPr lang="en-GB" sz="3200" dirty="0">
+              <a:latin typeface="Verdana" panose="020B0604030504040204" pitchFamily="34" charset="0"/>
+              <a:ea typeface="Verdana" panose="020B0604030504040204" pitchFamily="34" charset="0"/>
+              <a:cs typeface="Verdana" panose="020B0604030504040204" pitchFamily="34" charset="0"/>
+            </a:endParaRPr>
+          </a:p>
+          <a:p>
+            <a:pPr algn="l"/>
+            <a:endParaRPr lang="en-GB" sz="3200" dirty="0">
+              <a:latin typeface="Verdana" panose="020B0604030504040204" pitchFamily="34" charset="0"/>
+              <a:ea typeface="Verdana" panose="020B0604030504040204" pitchFamily="34" charset="0"/>
+              <a:cs typeface="Verdana" panose="020B0604030504040204" pitchFamily="34" charset="0"/>
+            </a:endParaRPr>
+          </a:p>
+          <a:p>
+            <a:pPr algn="l"/>
+            <a:endParaRPr lang="en-GB" sz="3200" dirty="0">
+              <a:latin typeface="Verdana" panose="020B0604030504040204" pitchFamily="34" charset="0"/>
+              <a:ea typeface="Verdana" panose="020B0604030504040204" pitchFamily="34" charset="0"/>
+              <a:cs typeface="Verdana" panose="020B0604030504040204" pitchFamily="34" charset="0"/>
+            </a:endParaRPr>
+          </a:p>
+          <a:p>
+            <a:pPr algn="l"/>
+            <a:endParaRPr lang="en-GB" sz="3200" dirty="0">
+              <a:latin typeface="Verdana" panose="020B0604030504040204" pitchFamily="34" charset="0"/>
+              <a:ea typeface="Verdana" panose="020B0604030504040204" pitchFamily="34" charset="0"/>
+              <a:cs typeface="Verdana" panose="020B0604030504040204" pitchFamily="34" charset="0"/>
+            </a:endParaRPr>
+          </a:p>
+          <a:p>
+            <a:pPr algn="l"/>
+            <a:endParaRPr lang="en-GB" sz="3200" dirty="0">
+              <a:latin typeface="Verdana" panose="020B0604030504040204" pitchFamily="34" charset="0"/>
+              <a:ea typeface="Verdana" panose="020B0604030504040204" pitchFamily="34" charset="0"/>
+              <a:cs typeface="Verdana" panose="020B0604030504040204" pitchFamily="34" charset="0"/>
+            </a:endParaRPr>
+          </a:p>
+          <a:p>
+            <a:pPr algn="l"/>
+            <a:endParaRPr lang="en-GB" sz="3200" dirty="0">
+              <a:latin typeface="Verdana" panose="020B0604030504040204" pitchFamily="34" charset="0"/>
+              <a:ea typeface="Verdana" panose="020B0604030504040204" pitchFamily="34" charset="0"/>
+              <a:cs typeface="Verdana" panose="020B0604030504040204" pitchFamily="34" charset="0"/>
+            </a:endParaRPr>
+          </a:p>
+          <a:p>
+            <a:pPr algn="l"/>
+            <a:endParaRPr lang="en-GB" sz="3200" dirty="0">
+              <a:latin typeface="Verdana" panose="020B0604030504040204" pitchFamily="34" charset="0"/>
+              <a:ea typeface="Verdana" panose="020B0604030504040204" pitchFamily="34" charset="0"/>
+              <a:cs typeface="Verdana" panose="020B0604030504040204" pitchFamily="34" charset="0"/>
+            </a:endParaRPr>
+          </a:p>
+          <a:p>
+            <a:pPr algn="l"/>
+            <a:endParaRPr lang="en-GB" sz="3200" dirty="0">
+              <a:latin typeface="Verdana" panose="020B0604030504040204" pitchFamily="34" charset="0"/>
+              <a:ea typeface="Verdana" panose="020B0604030504040204" pitchFamily="34" charset="0"/>
+              <a:cs typeface="Verdana" panose="020B0604030504040204" pitchFamily="34" charset="0"/>
+            </a:endParaRPr>
+          </a:p>
+          <a:p>
+            <a:pPr algn="l"/>
+            <a:endParaRPr lang="en-GB" sz="3200" dirty="0">
+              <a:latin typeface="Verdana" panose="020B0604030504040204" pitchFamily="34" charset="0"/>
+              <a:ea typeface="Verdana" panose="020B0604030504040204" pitchFamily="34" charset="0"/>
+              <a:cs typeface="Verdana" panose="020B0604030504040204" pitchFamily="34" charset="0"/>
+            </a:endParaRPr>
           </a:p>
         </p:txBody>
       </p:sp>
@@ -5740,8 +5954,8 @@
         </p:nvSpPr>
         <p:spPr bwMode="auto">
           <a:xfrm>
-            <a:off x="366268" y="24785083"/>
-            <a:ext cx="26964132" cy="5018792"/>
+            <a:off x="366268" y="23523156"/>
+            <a:ext cx="26964132" cy="6264691"/>
           </a:xfrm>
           <a:prstGeom prst="roundRect">
             <a:avLst>
@@ -5785,8 +5999,8 @@
         </p:nvSpPr>
         <p:spPr bwMode="auto">
           <a:xfrm>
-            <a:off x="725589" y="26052029"/>
-            <a:ext cx="26249212" cy="3529420"/>
+            <a:off x="725589" y="24790103"/>
+            <a:ext cx="26249212" cy="5006747"/>
           </a:xfrm>
           <a:prstGeom prst="rect">
             <a:avLst/>
@@ -5902,6 +6116,51 @@
               <a:t>. In Proceedings of the 12th Workshop on User Interfaces for Theorem Provers, Coimbra, Portugal, July 2016.</a:t>
             </a:r>
           </a:p>
+          <a:p>
+            <a:pPr marL="742950" indent="-742950" algn="just">
+              <a:buAutoNum type="arabicPeriod"/>
+            </a:pPr>
+            <a:r>
+              <a:rPr lang="en-GB" sz="3200" dirty="0" err="1"/>
+              <a:t>Barthe</a:t>
+            </a:r>
+            <a:r>
+              <a:rPr lang="en-GB" sz="3200" dirty="0"/>
+              <a:t>, G., </a:t>
+            </a:r>
+            <a:r>
+              <a:rPr lang="en-GB" sz="3200" dirty="0" err="1"/>
+              <a:t>Gaboardi</a:t>
+            </a:r>
+            <a:r>
+              <a:rPr lang="en-GB" sz="3200" dirty="0"/>
+              <a:t>, M., Arias, E.J.G., Hsu, J., Roth, A., </a:t>
+            </a:r>
+            <a:r>
+              <a:rPr lang="en-GB" sz="3200" dirty="0" err="1"/>
+              <a:t>Strub</a:t>
+            </a:r>
+            <a:r>
+              <a:rPr lang="en-GB" sz="3200" dirty="0"/>
+              <a:t>, PY. (2016). Computer-Aided Verification for Mechanism Design. In: Cai, Y., </a:t>
+            </a:r>
+            <a:r>
+              <a:rPr lang="en-GB" sz="3200" dirty="0" err="1"/>
+              <a:t>Vetta</a:t>
+            </a:r>
+            <a:r>
+              <a:rPr lang="en-GB" sz="3200" dirty="0"/>
+              <a:t>, A. (eds) Web and Internet Economics. WINE 2016. Lecture Notes in Computer Science(), vol 10123. Springer, Berlin, Heidelberg. https://</a:t>
+            </a:r>
+            <a:r>
+              <a:rPr lang="en-GB" sz="3200" dirty="0" err="1"/>
+              <a:t>doi.org</a:t>
+            </a:r>
+            <a:r>
+              <a:rPr lang="en-GB" sz="3200" dirty="0"/>
+              <a:t>/10.1007/978-3-662-54110-4_20</a:t>
+            </a:r>
+          </a:p>
         </p:txBody>
       </p:sp>
       <p:sp>
@@ -5920,7 +6179,7 @@
         </p:nvSpPr>
         <p:spPr bwMode="auto">
           <a:xfrm>
-            <a:off x="784468" y="24785084"/>
+            <a:off x="784468" y="23523158"/>
             <a:ext cx="6769857" cy="1097985"/>
           </a:xfrm>
           <a:prstGeom prst="rect">
@@ -5949,157 +6208,6 @@
             <a:r>
               <a:rPr lang="en-US" sz="6600" b="1" dirty="0"/>
               <a:t>Bibliography</a:t>
-            </a:r>
-          </a:p>
-        </p:txBody>
-      </p:sp>
-      <p:sp>
-        <p:nvSpPr>
-          <p:cNvPr id="24" name="AutoShape 4">
-            <a:extLst>
-              <a:ext uri="{FF2B5EF4-FFF2-40B4-BE49-F238E27FC236}">
-                <a16:creationId xmlns:a16="http://schemas.microsoft.com/office/drawing/2014/main" id="{95F94DEB-4AE4-5F43-923B-C6652EAB7F0D}"/>
-              </a:ext>
-            </a:extLst>
-          </p:cNvPr>
-          <p:cNvSpPr>
-            <a:spLocks noChangeArrowheads="1"/>
-          </p:cNvSpPr>
-          <p:nvPr/>
-        </p:nvSpPr>
-        <p:spPr bwMode="auto">
-          <a:xfrm>
-            <a:off x="27563519" y="19802258"/>
-            <a:ext cx="14939567" cy="4734142"/>
-          </a:xfrm>
-          <a:prstGeom prst="roundRect">
-            <a:avLst>
-              <a:gd name="adj" fmla="val 7000"/>
-            </a:avLst>
-          </a:prstGeom>
-          <a:solidFill>
-            <a:schemeClr val="bg1"/>
-          </a:solidFill>
-          <a:ln w="9525">
-            <a:solidFill>
-              <a:schemeClr val="tx1"/>
-            </a:solidFill>
-            <a:round/>
-            <a:headEnd/>
-            <a:tailEnd/>
-          </a:ln>
-          <a:effectLst/>
-        </p:spPr>
-        <p:txBody>
-          <a:bodyPr wrap="none" anchor="ctr"/>
-          <a:lstStyle/>
-          <a:p>
-            <a:endParaRPr lang="en-US" sz="12731" dirty="0"/>
-          </a:p>
-        </p:txBody>
-      </p:sp>
-      <p:sp>
-        <p:nvSpPr>
-          <p:cNvPr id="25" name="Text Box 42">
-            <a:extLst>
-              <a:ext uri="{FF2B5EF4-FFF2-40B4-BE49-F238E27FC236}">
-                <a16:creationId xmlns:a16="http://schemas.microsoft.com/office/drawing/2014/main" id="{B7599659-AE1C-514F-B2EE-36800FB13529}"/>
-              </a:ext>
-            </a:extLst>
-          </p:cNvPr>
-          <p:cNvSpPr txBox="1">
-            <a:spLocks noChangeArrowheads="1"/>
-          </p:cNvSpPr>
-          <p:nvPr/>
-        </p:nvSpPr>
-        <p:spPr bwMode="auto">
-          <a:xfrm>
-            <a:off x="27910605" y="19935338"/>
-            <a:ext cx="13796354" cy="1097985"/>
-          </a:xfrm>
-          <a:prstGeom prst="rect">
-            <a:avLst/>
-          </a:prstGeom>
-          <a:noFill/>
-          <a:ln w="9525">
-            <a:noFill/>
-            <a:miter lim="800000"/>
-            <a:headEnd/>
-            <a:tailEnd/>
-          </a:ln>
-          <a:effectLst/>
-        </p:spPr>
-        <p:txBody>
-          <a:bodyPr wrap="square" lIns="81527" tIns="40763" rIns="81527" bIns="40763">
-            <a:spAutoFit/>
-          </a:bodyPr>
-          <a:lstStyle/>
-          <a:p>
-            <a:pPr algn="l" defTabSz="3914109">
-              <a:spcBef>
-                <a:spcPct val="50000"/>
-              </a:spcBef>
-            </a:pPr>
-            <a:r>
-              <a:rPr lang="en-US" sz="6600" b="1" dirty="0"/>
-              <a:t>Conclusion</a:t>
-            </a:r>
-          </a:p>
-        </p:txBody>
-      </p:sp>
-      <p:sp>
-        <p:nvSpPr>
-          <p:cNvPr id="26" name="Text Box 9">
-            <a:extLst>
-              <a:ext uri="{FF2B5EF4-FFF2-40B4-BE49-F238E27FC236}">
-                <a16:creationId xmlns:a16="http://schemas.microsoft.com/office/drawing/2014/main" id="{DD8CB570-938B-474B-979B-9F4A8F01BBDA}"/>
-              </a:ext>
-            </a:extLst>
-          </p:cNvPr>
-          <p:cNvSpPr txBox="1">
-            <a:spLocks noChangeArrowheads="1"/>
-          </p:cNvSpPr>
-          <p:nvPr/>
-        </p:nvSpPr>
-        <p:spPr bwMode="auto">
-          <a:xfrm>
-            <a:off x="27910605" y="20999258"/>
-            <a:ext cx="13965215" cy="3160088"/>
-          </a:xfrm>
-          <a:prstGeom prst="rect">
-            <a:avLst/>
-          </a:prstGeom>
-          <a:noFill/>
-          <a:ln w="9525">
-            <a:noFill/>
-            <a:miter lim="800000"/>
-            <a:headEnd/>
-            <a:tailEnd/>
-          </a:ln>
-          <a:effectLst/>
-        </p:spPr>
-        <p:txBody>
-          <a:bodyPr wrap="square" lIns="81527" tIns="40763" rIns="81527" bIns="40763">
-            <a:spAutoFit/>
-          </a:bodyPr>
-          <a:lstStyle/>
-          <a:p>
-            <a:pPr algn="just"/>
-            <a:r>
-              <a:rPr lang="en-GB" sz="4000" dirty="0" err="1"/>
-              <a:t>mech.v</a:t>
-            </a:r>
-            <a:r>
-              <a:rPr lang="en-GB" sz="4000" dirty="0"/>
-              <a:t> is a 6000-line Coq library based on </a:t>
-            </a:r>
-            <a:r>
-              <a:rPr lang="en-GB" sz="4000" dirty="0" err="1"/>
-              <a:t>SSReflect</a:t>
-            </a:r>
-            <a:r>
-              <a:rPr lang="en-GB" sz="4000" dirty="0"/>
-              <a:t> and the MC library. We believe it provides a strong infrastructure from which sound, formally machine-verified existing and new mechanisms can be developed, helping increase the confidence the services they offer are well-founded. </a:t>
             </a:r>
           </a:p>
         </p:txBody>
@@ -6258,7 +6366,7 @@
             </a:pPr>
             <a:r>
               <a:rPr lang="en-GB" sz="4000" dirty="0"/>
-              <a:t>tackling voting or probabilistic mechanisms, or</a:t>
+              <a:t>tackling voting or probabilistic mechanisms [5], or</a:t>
             </a:r>
           </a:p>
           <a:p>

</xml_diff>

<commit_message>
Updating Emilio's data, plus mentioning exponential growth of math pubs.
</commit_message>
<xml_diff>
--- a/EC Poster landscape.pptx
+++ b/EC Poster landscape.pptx
@@ -197,7 +197,7 @@
           <a:p>
             <a:fld id="{17E480F3-3EE5-9048-8CE1-6D7B76C3A5A1}" type="datetimeFigureOut">
               <a:rPr lang="en-FR" smtClean="0"/>
-              <a:t>13/06/2022</a:t>
+              <a:t>14/06/2022</a:t>
             </a:fld>
             <a:endParaRPr lang="en-FR"/>
           </a:p>
@@ -680,7 +680,7 @@
           <a:p>
             <a:fld id="{F3A114C4-1913-F640-BCBB-6052C52800F7}" type="datetimeFigureOut">
               <a:rPr lang="en-FR" smtClean="0"/>
-              <a:t>13/06/2022</a:t>
+              <a:t>14/06/2022</a:t>
             </a:fld>
             <a:endParaRPr lang="en-FR"/>
           </a:p>
@@ -850,7 +850,7 @@
           <a:p>
             <a:fld id="{F3A114C4-1913-F640-BCBB-6052C52800F7}" type="datetimeFigureOut">
               <a:rPr lang="en-FR" smtClean="0"/>
-              <a:t>13/06/2022</a:t>
+              <a:t>14/06/2022</a:t>
             </a:fld>
             <a:endParaRPr lang="en-FR"/>
           </a:p>
@@ -1030,7 +1030,7 @@
           <a:p>
             <a:fld id="{F3A114C4-1913-F640-BCBB-6052C52800F7}" type="datetimeFigureOut">
               <a:rPr lang="en-FR" smtClean="0"/>
-              <a:t>13/06/2022</a:t>
+              <a:t>14/06/2022</a:t>
             </a:fld>
             <a:endParaRPr lang="en-FR"/>
           </a:p>
@@ -1200,7 +1200,7 @@
           <a:p>
             <a:fld id="{F3A114C4-1913-F640-BCBB-6052C52800F7}" type="datetimeFigureOut">
               <a:rPr lang="en-FR" smtClean="0"/>
-              <a:t>13/06/2022</a:t>
+              <a:t>14/06/2022</a:t>
             </a:fld>
             <a:endParaRPr lang="en-FR"/>
           </a:p>
@@ -1444,7 +1444,7 @@
           <a:p>
             <a:fld id="{F3A114C4-1913-F640-BCBB-6052C52800F7}" type="datetimeFigureOut">
               <a:rPr lang="en-FR" smtClean="0"/>
-              <a:t>13/06/2022</a:t>
+              <a:t>14/06/2022</a:t>
             </a:fld>
             <a:endParaRPr lang="en-FR"/>
           </a:p>
@@ -1676,7 +1676,7 @@
           <a:p>
             <a:fld id="{F3A114C4-1913-F640-BCBB-6052C52800F7}" type="datetimeFigureOut">
               <a:rPr lang="en-FR" smtClean="0"/>
-              <a:t>13/06/2022</a:t>
+              <a:t>14/06/2022</a:t>
             </a:fld>
             <a:endParaRPr lang="en-FR"/>
           </a:p>
@@ -2043,7 +2043,7 @@
           <a:p>
             <a:fld id="{F3A114C4-1913-F640-BCBB-6052C52800F7}" type="datetimeFigureOut">
               <a:rPr lang="en-FR" smtClean="0"/>
-              <a:t>13/06/2022</a:t>
+              <a:t>14/06/2022</a:t>
             </a:fld>
             <a:endParaRPr lang="en-FR"/>
           </a:p>
@@ -2161,7 +2161,7 @@
           <a:p>
             <a:fld id="{F3A114C4-1913-F640-BCBB-6052C52800F7}" type="datetimeFigureOut">
               <a:rPr lang="en-FR" smtClean="0"/>
-              <a:t>13/06/2022</a:t>
+              <a:t>14/06/2022</a:t>
             </a:fld>
             <a:endParaRPr lang="en-FR"/>
           </a:p>
@@ -2256,7 +2256,7 @@
           <a:p>
             <a:fld id="{F3A114C4-1913-F640-BCBB-6052C52800F7}" type="datetimeFigureOut">
               <a:rPr lang="en-FR" smtClean="0"/>
-              <a:t>13/06/2022</a:t>
+              <a:t>14/06/2022</a:t>
             </a:fld>
             <a:endParaRPr lang="en-FR"/>
           </a:p>
@@ -2533,7 +2533,7 @@
           <a:p>
             <a:fld id="{F3A114C4-1913-F640-BCBB-6052C52800F7}" type="datetimeFigureOut">
               <a:rPr lang="en-FR" smtClean="0"/>
-              <a:t>13/06/2022</a:t>
+              <a:t>14/06/2022</a:t>
             </a:fld>
             <a:endParaRPr lang="en-FR"/>
           </a:p>
@@ -2790,7 +2790,7 @@
           <a:p>
             <a:fld id="{F3A114C4-1913-F640-BCBB-6052C52800F7}" type="datetimeFigureOut">
               <a:rPr lang="en-FR" smtClean="0"/>
-              <a:t>13/06/2022</a:t>
+              <a:t>14/06/2022</a:t>
             </a:fld>
             <a:endParaRPr lang="en-FR"/>
           </a:p>
@@ -3003,7 +3003,7 @@
           <a:p>
             <a:fld id="{F3A114C4-1913-F640-BCBB-6052C52800F7}" type="datetimeFigureOut">
               <a:rPr lang="en-FR" smtClean="0"/>
-              <a:t>13/06/2022</a:t>
+              <a:t>14/06/2022</a:t>
             </a:fld>
             <a:endParaRPr lang="en-FR"/>
           </a:p>
@@ -3541,7 +3541,7 @@
             </a:r>
             <a:r>
               <a:rPr lang="en-US" sz="3589" dirty="0"/>
-              <a:t>Mines Paris, PSL University, France</a:t>
+              <a:t>Mines Paris, PSL University, Paris, France</a:t>
             </a:r>
           </a:p>
           <a:p>
@@ -3552,7 +3552,23 @@
             </a:r>
             <a:r>
               <a:rPr lang="en-US" sz="3589" dirty="0"/>
-              <a:t>Inria Paris, France</a:t>
+              <a:t>Université Paris </a:t>
+            </a:r>
+            <a:r>
+              <a:rPr lang="en-US" sz="3589" dirty="0" err="1"/>
+              <a:t>Cité</a:t>
+            </a:r>
+            <a:r>
+              <a:rPr lang="en-US" sz="3589" dirty="0"/>
+              <a:t>, CNRS, </a:t>
+            </a:r>
+            <a:r>
+              <a:rPr lang="en-US" sz="3589" dirty="0" err="1"/>
+              <a:t>Inria</a:t>
+            </a:r>
+            <a:r>
+              <a:rPr lang="en-US" sz="3589" dirty="0"/>
+              <a:t>, IRIF, F-75013, Paris, France</a:t>
             </a:r>
             <a:br>
               <a:rPr lang="en-US" sz="3589" dirty="0"/>
@@ -4204,7 +4220,7 @@
         <p:spPr bwMode="auto">
           <a:xfrm>
             <a:off x="14436203" y="7620765"/>
-            <a:ext cx="12538598" cy="15471150"/>
+            <a:ext cx="12538598" cy="17317810"/>
           </a:xfrm>
           <a:prstGeom prst="rect">
             <a:avLst/>
@@ -4264,7 +4280,7 @@
             </a:r>
             <a:r>
               <a:rPr lang="en-GB" sz="4000" dirty="0"/>
-              <a:t> To benefit from the additional assurance that a mechanized proof brings compared to a pen-and-paper proof outline, we borrow a common technique from the computer science literature, </a:t>
+              <a:t> To benefit from the additional assurance that a mechanized proof brings compared to a pen-and-paper proof outline (an issue of increasing importance, given the exponential growth in the number of mathematical papers reviewed and published each year), we borrow a technique from the computer science literature, </a:t>
             </a:r>
             <a:r>
               <a:rPr lang="en-GB" sz="4000" b="1" dirty="0"/>
@@ -6150,7 +6166,7 @@
             </a:r>
             <a:r>
               <a:rPr lang="en-GB" sz="3200" dirty="0"/>
-              <a:t>, A. (eds) Web and Internet Economics. WINE 2016. Lecture Notes in Computer Science(), vol 10123. Springer, Berlin, Heidelberg. https://</a:t>
+              <a:t>, A. (eds) Web and Internet Economics. WINE 2016. Lecture Notes in Computer Science, vol 10123. Springer, Berlin, Heidelberg. https://</a:t>
             </a:r>
             <a:r>
               <a:rPr lang="en-GB" sz="3200" dirty="0" err="1"/>

</xml_diff>

<commit_message>
Final version for EC.
</commit_message>
<xml_diff>
--- a/EC Poster landscape.pptx
+++ b/EC Poster landscape.pptx
@@ -197,7 +197,7 @@
           <a:p>
             <a:fld id="{17E480F3-3EE5-9048-8CE1-6D7B76C3A5A1}" type="datetimeFigureOut">
               <a:rPr lang="en-FR" smtClean="0"/>
-              <a:t>14/06/2022</a:t>
+              <a:t>15/06/2022</a:t>
             </a:fld>
             <a:endParaRPr lang="en-FR"/>
           </a:p>
@@ -680,7 +680,7 @@
           <a:p>
             <a:fld id="{F3A114C4-1913-F640-BCBB-6052C52800F7}" type="datetimeFigureOut">
               <a:rPr lang="en-FR" smtClean="0"/>
-              <a:t>14/06/2022</a:t>
+              <a:t>15/06/2022</a:t>
             </a:fld>
             <a:endParaRPr lang="en-FR"/>
           </a:p>
@@ -850,7 +850,7 @@
           <a:p>
             <a:fld id="{F3A114C4-1913-F640-BCBB-6052C52800F7}" type="datetimeFigureOut">
               <a:rPr lang="en-FR" smtClean="0"/>
-              <a:t>14/06/2022</a:t>
+              <a:t>15/06/2022</a:t>
             </a:fld>
             <a:endParaRPr lang="en-FR"/>
           </a:p>
@@ -1030,7 +1030,7 @@
           <a:p>
             <a:fld id="{F3A114C4-1913-F640-BCBB-6052C52800F7}" type="datetimeFigureOut">
               <a:rPr lang="en-FR" smtClean="0"/>
-              <a:t>14/06/2022</a:t>
+              <a:t>15/06/2022</a:t>
             </a:fld>
             <a:endParaRPr lang="en-FR"/>
           </a:p>
@@ -1200,7 +1200,7 @@
           <a:p>
             <a:fld id="{F3A114C4-1913-F640-BCBB-6052C52800F7}" type="datetimeFigureOut">
               <a:rPr lang="en-FR" smtClean="0"/>
-              <a:t>14/06/2022</a:t>
+              <a:t>15/06/2022</a:t>
             </a:fld>
             <a:endParaRPr lang="en-FR"/>
           </a:p>
@@ -1444,7 +1444,7 @@
           <a:p>
             <a:fld id="{F3A114C4-1913-F640-BCBB-6052C52800F7}" type="datetimeFigureOut">
               <a:rPr lang="en-FR" smtClean="0"/>
-              <a:t>14/06/2022</a:t>
+              <a:t>15/06/2022</a:t>
             </a:fld>
             <a:endParaRPr lang="en-FR"/>
           </a:p>
@@ -1676,7 +1676,7 @@
           <a:p>
             <a:fld id="{F3A114C4-1913-F640-BCBB-6052C52800F7}" type="datetimeFigureOut">
               <a:rPr lang="en-FR" smtClean="0"/>
-              <a:t>14/06/2022</a:t>
+              <a:t>15/06/2022</a:t>
             </a:fld>
             <a:endParaRPr lang="en-FR"/>
           </a:p>
@@ -2043,7 +2043,7 @@
           <a:p>
             <a:fld id="{F3A114C4-1913-F640-BCBB-6052C52800F7}" type="datetimeFigureOut">
               <a:rPr lang="en-FR" smtClean="0"/>
-              <a:t>14/06/2022</a:t>
+              <a:t>15/06/2022</a:t>
             </a:fld>
             <a:endParaRPr lang="en-FR"/>
           </a:p>
@@ -2161,7 +2161,7 @@
           <a:p>
             <a:fld id="{F3A114C4-1913-F640-BCBB-6052C52800F7}" type="datetimeFigureOut">
               <a:rPr lang="en-FR" smtClean="0"/>
-              <a:t>14/06/2022</a:t>
+              <a:t>15/06/2022</a:t>
             </a:fld>
             <a:endParaRPr lang="en-FR"/>
           </a:p>
@@ -2256,7 +2256,7 @@
           <a:p>
             <a:fld id="{F3A114C4-1913-F640-BCBB-6052C52800F7}" type="datetimeFigureOut">
               <a:rPr lang="en-FR" smtClean="0"/>
-              <a:t>14/06/2022</a:t>
+              <a:t>15/06/2022</a:t>
             </a:fld>
             <a:endParaRPr lang="en-FR"/>
           </a:p>
@@ -2533,7 +2533,7 @@
           <a:p>
             <a:fld id="{F3A114C4-1913-F640-BCBB-6052C52800F7}" type="datetimeFigureOut">
               <a:rPr lang="en-FR" smtClean="0"/>
-              <a:t>14/06/2022</a:t>
+              <a:t>15/06/2022</a:t>
             </a:fld>
             <a:endParaRPr lang="en-FR"/>
           </a:p>
@@ -2790,7 +2790,7 @@
           <a:p>
             <a:fld id="{F3A114C4-1913-F640-BCBB-6052C52800F7}" type="datetimeFigureOut">
               <a:rPr lang="en-FR" smtClean="0"/>
-              <a:t>14/06/2022</a:t>
+              <a:t>15/06/2022</a:t>
             </a:fld>
             <a:endParaRPr lang="en-FR"/>
           </a:p>
@@ -3003,7 +3003,7 @@
           <a:p>
             <a:fld id="{F3A114C4-1913-F640-BCBB-6052C52800F7}" type="datetimeFigureOut">
               <a:rPr lang="en-FR" smtClean="0"/>
-              <a:t>14/06/2022</a:t>
+              <a:t>15/06/2022</a:t>
             </a:fld>
             <a:endParaRPr lang="en-FR"/>
           </a:p>
@@ -4133,7 +4133,7 @@
             </a:r>
             <a:r>
               <a:rPr lang="en-GB" sz="4000" dirty="0"/>
-              <a:t>based on typing rules and tactic languages. A large number of existing libraries such as Mathematical Components enable a </a:t>
+              <a:t>based on typing rules and tactic languages. A large number of existing libraries such as Mathematical Components (MC) enable a </a:t>
             </a:r>
             <a:r>
               <a:rPr lang="en-GB" sz="4000" b="1" dirty="0"/>
@@ -4258,7 +4258,7 @@
             </a:r>
             <a:r>
               <a:rPr lang="en-GB" sz="4000" dirty="0"/>
-              <a:t> library includes the specifications and correctness theorems (e.g., truthfulness, rationality, or dominance) of well-known mechanisms and auctions such as the </a:t>
+              <a:t> library includes the specifications and correctness theorems (e.g., truthfulness, rationality, and dominance) of well-known mechanisms and auctions such as the </a:t>
             </a:r>
             <a:r>
               <a:rPr lang="en-GB" sz="4000" dirty="0" err="1"/>
@@ -4266,7 +4266,7 @@
             </a:r>
             <a:r>
               <a:rPr lang="en-GB" sz="4000" dirty="0"/>
-              <a:t>-Clarke-Groves (VCG) mechanism, the VCG auction for online ad or First Price and Second Price auctions.</a:t>
+              <a:t>-Clarke-Groves (VCG) mechanism, the VCG auction for online ads or First Price and Second Price auctions.</a:t>
             </a:r>
           </a:p>
           <a:p>
@@ -4280,7 +4280,7 @@
             </a:r>
             <a:r>
               <a:rPr lang="en-GB" sz="4000" dirty="0"/>
-              <a:t> To benefit from the additional assurance that a mechanized proof brings compared to a pen-and-paper proof outline (an issue of increasing importance, given the exponential growth in the number of mathematical papers reviewed and published each year), we borrow a technique from the computer science literature, </a:t>
+              <a:t> To benefit from the additional assurance that a mechanized proof brings compared to a pen-and-paper proof outline (an issue of increasing importance, given the exponential growth in the number of mathematical papers reviewed and published every year), we borrow a technique from the computer science literature, </a:t>
             </a:r>
             <a:r>
               <a:rPr lang="en-GB" sz="4000" b="1" dirty="0"/>
@@ -4288,7 +4288,7 @@
             </a:r>
             <a:r>
               <a:rPr lang="en-GB" sz="4000" dirty="0"/>
-              <a:t> to prove that the implementation of VCG for online ads auctions is a refinement of the VCG mechanism, thus transferring its general truthfulness property for (almost) free. </a:t>
+              <a:t> to prove that the implementation of VCG auction for online ads is a refinement of the VCG mechanism, thus transferring its general truthfulness property for (almost) free. </a:t>
             </a:r>
           </a:p>
           <a:p>
@@ -4298,7 +4298,7 @@
             </a:pPr>
             <a:r>
               <a:rPr lang="en-GB" sz="4000" b="1" dirty="0"/>
-              <a:t>Extension;</a:t>
+              <a:t>Extension.</a:t>
             </a:r>
             <a:r>
               <a:rPr lang="en-GB" sz="4000" dirty="0"/>
@@ -4522,7 +4522,7 @@
                 <a:ea typeface="Verdana" panose="020B0604030504040204" pitchFamily="34" charset="0"/>
                 <a:cs typeface="Arial" panose="020B0604020202020204" pitchFamily="34" charset="0"/>
               </a:rPr>
-              <a:t>A direct Coq specification of the General VCG mechanism involving </a:t>
+              <a:t>A direct Coq specification of the VCG mechanism involving </a:t>
             </a:r>
             <a:r>
               <a:rPr lang="en-GB" sz="4000" i="1" dirty="0">
@@ -4776,7 +4776,7 @@
                 <a:ea typeface="Verdana" panose="020B0604030504040204" pitchFamily="34" charset="0"/>
                 <a:cs typeface="Verdana" panose="020B0604030504040204" pitchFamily="34" charset="0"/>
               </a:rPr>
-              <a:t>}.   </a:t>
+              <a:t>}.          </a:t>
             </a:r>
             <a:r>
               <a:rPr lang="en-GB" sz="3200" dirty="0">
@@ -4789,7 +4789,7 @@
                 <a:ea typeface="Verdana" panose="020B0604030504040204" pitchFamily="34" charset="0"/>
                 <a:cs typeface="Verdana" panose="020B0604030504040204" pitchFamily="34" charset="0"/>
               </a:rPr>
-              <a:t>(* from outcomes to bids *)</a:t>
+              <a:t>(* outcomes to bids *)</a:t>
             </a:r>
             <a:br>
               <a:rPr lang="en-GB" sz="3200" dirty="0">
@@ -4815,7 +4815,20 @@
                 <a:ea typeface="Verdana" panose="020B0604030504040204" pitchFamily="34" charset="0"/>
                 <a:cs typeface="Verdana" panose="020B0604030504040204" pitchFamily="34" charset="0"/>
               </a:rPr>
-              <a:t> biddings := n.−tuple bidding.</a:t>
+              <a:t> biddings := n.−tuple bidding</a:t>
+            </a:r>
+            <a:r>
+              <a:rPr lang="en-GB" sz="3200" dirty="0">
+                <a:solidFill>
+                  <a:schemeClr val="accent2">
+                    <a:lumMod val="75000"/>
+                  </a:schemeClr>
+                </a:solidFill>
+                <a:latin typeface="Verdana" panose="020B0604030504040204" pitchFamily="34" charset="0"/>
+                <a:ea typeface="Verdana" panose="020B0604030504040204" pitchFamily="34" charset="0"/>
+                <a:cs typeface="Verdana" panose="020B0604030504040204" pitchFamily="34" charset="0"/>
+              </a:rPr>
+              <a:t>.         (* … for all agents *)</a:t>
             </a:r>
           </a:p>
           <a:p>
@@ -4844,7 +4857,20 @@
                 <a:ea typeface="Verdana" panose="020B0604030504040204" pitchFamily="34" charset="0"/>
                 <a:cs typeface="Verdana" panose="020B0604030504040204" pitchFamily="34" charset="0"/>
               </a:rPr>
-              <a:t> (bs: biddings).</a:t>
+              <a:t> (bs: biddings).	</a:t>
+            </a:r>
+            <a:r>
+              <a:rPr lang="en-GB" sz="3200" dirty="0">
+                <a:solidFill>
+                  <a:schemeClr val="accent2">
+                    <a:lumMod val="75000"/>
+                  </a:schemeClr>
+                </a:solidFill>
+                <a:latin typeface="Verdana" panose="020B0604030504040204" pitchFamily="34" charset="0"/>
+                <a:ea typeface="Verdana" panose="020B0604030504040204" pitchFamily="34" charset="0"/>
+                <a:cs typeface="Verdana" panose="020B0604030504040204" pitchFamily="34" charset="0"/>
+              </a:rPr>
+              <a:t>   (* abstracting over a tuple of biddings *)</a:t>
             </a:r>
             <a:br>
               <a:rPr lang="en-GB" sz="3200" dirty="0">
@@ -5158,7 +5184,7 @@
                 <a:ea typeface="Verdana" panose="020B0604030504040204" pitchFamily="34" charset="0"/>
                 <a:cs typeface="Verdana" panose="020B0604030504040204" pitchFamily="34" charset="0"/>
               </a:rPr>
-              <a:t>:=[</a:t>
+              <a:t> := [</a:t>
             </a:r>
             <a:r>
               <a:rPr lang="en-GB" sz="3200" dirty="0">
@@ -5741,7 +5767,7 @@
                 <a:ea typeface="Verdana" panose="020B0604030504040204" pitchFamily="34" charset="0"/>
                 <a:cs typeface="Verdana" panose="020B0604030504040204" pitchFamily="34" charset="0"/>
               </a:rPr>
-              <a:t> (see [1]).</a:t>
+              <a:t> (see [1]):</a:t>
             </a:r>
           </a:p>
           <a:p>
@@ -5781,7 +5807,7 @@
                 <a:ea typeface="Verdana" panose="020B0604030504040204" pitchFamily="34" charset="0"/>
                 <a:cs typeface="Verdana" panose="020B0604030504040204" pitchFamily="34" charset="0"/>
               </a:rPr>
-              <a:t>truthful_General_VCG</a:t>
+              <a:t>truthful_VCG</a:t>
             </a:r>
             <a:r>
               <a:rPr lang="en-GB" sz="3200" dirty="0">
@@ -6015,7 +6041,7 @@
         </p:nvSpPr>
         <p:spPr bwMode="auto">
           <a:xfrm>
-            <a:off x="725589" y="24790103"/>
+            <a:off x="725589" y="24688503"/>
             <a:ext cx="26249212" cy="5006747"/>
           </a:xfrm>
           <a:prstGeom prst="rect">
@@ -6049,7 +6075,7 @@
             </a:r>
             <a:r>
               <a:rPr lang="en-GB" sz="3200" dirty="0"/>
-              <a:t>. Mines Paris Tech. Rep., 2022  (https://</a:t>
+              <a:t>. Mines Paris, CRI Tech. Rep., 2022  (https://</a:t>
             </a:r>
             <a:r>
               <a:rPr lang="en-GB" sz="3200" dirty="0" err="1"/>
@@ -6065,7 +6091,7 @@
             </a:r>
             <a:r>
               <a:rPr lang="en-GB" sz="3200" dirty="0"/>
-              <a:t>/doc/E-458.pdf)</a:t>
+              <a:t>/doc/E-458.pdf).</a:t>
             </a:r>
           </a:p>
           <a:p>
@@ -6095,7 +6121,7 @@
             </a:r>
             <a:r>
               <a:rPr lang="en-GB" sz="3200" dirty="0"/>
-              <a:t>, P.. Springer Science &amp; Business Media, 2013. </a:t>
+              <a:t>, P. </a:t>
             </a:r>
             <a:r>
               <a:rPr lang="en-GB" sz="3200" i="1" dirty="0"/>
@@ -6107,9 +6133,12 @@
             </a:r>
             <a:r>
               <a:rPr lang="en-GB" sz="3200" i="1" dirty="0"/>
-              <a:t>: the calculus of inductive constructions</a:t>
-            </a:r>
-            <a:endParaRPr lang="en-GB" sz="3200" dirty="0"/>
+              <a:t>: the calculus of inductive constructions. </a:t>
+            </a:r>
+            <a:r>
+              <a:rPr lang="en-GB" sz="3200" dirty="0"/>
+              <a:t>Springer Science &amp; Business Media, 2013. </a:t>
+            </a:r>
           </a:p>
           <a:p>
             <a:pPr marL="742950" indent="-742950" algn="just">
@@ -6150,7 +6179,7 @@
             </a:r>
             <a:r>
               <a:rPr lang="en-GB" sz="3200" dirty="0"/>
-              <a:t>, M., Arias, E.J.G., Hsu, J., Roth, A., </a:t>
+              <a:t>, M., Arias, E.J.G., Hsu, J., Roth, A., and </a:t>
             </a:r>
             <a:r>
               <a:rPr lang="en-GB" sz="3200" dirty="0" err="1"/>
@@ -6158,7 +6187,15 @@
             </a:r>
             <a:r>
               <a:rPr lang="en-GB" sz="3200" dirty="0"/>
-              <a:t>, PY. (2016). Computer-Aided Verification for Mechanism Design. In: Cai, Y., </a:t>
+              <a:t>, P.-Y. </a:t>
+            </a:r>
+            <a:r>
+              <a:rPr lang="en-GB" sz="3200" i="1" dirty="0"/>
+              <a:t>Computer-Aided Verification for Mechanism Design</a:t>
+            </a:r>
+            <a:r>
+              <a:rPr lang="en-GB" sz="3200" dirty="0"/>
+              <a:t>. In: Cai, Y., </a:t>
             </a:r>
             <a:r>
               <a:rPr lang="en-GB" sz="3200" dirty="0" err="1"/>
@@ -6174,7 +6211,7 @@
             </a:r>
             <a:r>
               <a:rPr lang="en-GB" sz="3200" dirty="0"/>
-              <a:t>/10.1007/978-3-662-54110-4_20</a:t>
+              <a:t>/10.1007/978-3-662-54110-4_20.</a:t>
             </a:r>
           </a:p>
         </p:txBody>
@@ -6382,7 +6419,7 @@
             </a:pPr>
             <a:r>
               <a:rPr lang="en-GB" sz="4000" dirty="0"/>
-              <a:t>tackling voting or probabilistic mechanisms [5], or</a:t>
+              <a:t>tackling voting or probabilistic mechanisms [5];</a:t>
             </a:r>
           </a:p>
           <a:p>

</xml_diff>